<commit_message>
Testing for new Fibonacci program
</commit_message>
<xml_diff>
--- a/8bit_design/InstructionSet.pptx
+++ b/8bit_design/InstructionSet.pptx
@@ -260,7 +260,7 @@
           <a:p>
             <a:fld id="{EB96173F-77D8-3A4A-B83C-B33723880ECE}" type="datetimeFigureOut">
               <a:rPr kumimoji="1" lang="zh-CN" altLang="en-US" smtClean="0"/>
-              <a:t>2024/2/15</a:t>
+              <a:t>2024/2/28</a:t>
             </a:fld>
             <a:endParaRPr kumimoji="1" lang="zh-CN" altLang="en-US"/>
           </a:p>
@@ -458,7 +458,7 @@
           <a:p>
             <a:fld id="{EB96173F-77D8-3A4A-B83C-B33723880ECE}" type="datetimeFigureOut">
               <a:rPr kumimoji="1" lang="zh-CN" altLang="en-US" smtClean="0"/>
-              <a:t>2024/2/15</a:t>
+              <a:t>2024/2/28</a:t>
             </a:fld>
             <a:endParaRPr kumimoji="1" lang="zh-CN" altLang="en-US"/>
           </a:p>
@@ -666,7 +666,7 @@
           <a:p>
             <a:fld id="{EB96173F-77D8-3A4A-B83C-B33723880ECE}" type="datetimeFigureOut">
               <a:rPr kumimoji="1" lang="zh-CN" altLang="en-US" smtClean="0"/>
-              <a:t>2024/2/15</a:t>
+              <a:t>2024/2/28</a:t>
             </a:fld>
             <a:endParaRPr kumimoji="1" lang="zh-CN" altLang="en-US"/>
           </a:p>
@@ -864,7 +864,7 @@
           <a:p>
             <a:fld id="{EB96173F-77D8-3A4A-B83C-B33723880ECE}" type="datetimeFigureOut">
               <a:rPr kumimoji="1" lang="zh-CN" altLang="en-US" smtClean="0"/>
-              <a:t>2024/2/15</a:t>
+              <a:t>2024/2/28</a:t>
             </a:fld>
             <a:endParaRPr kumimoji="1" lang="zh-CN" altLang="en-US"/>
           </a:p>
@@ -1139,7 +1139,7 @@
           <a:p>
             <a:fld id="{EB96173F-77D8-3A4A-B83C-B33723880ECE}" type="datetimeFigureOut">
               <a:rPr kumimoji="1" lang="zh-CN" altLang="en-US" smtClean="0"/>
-              <a:t>2024/2/15</a:t>
+              <a:t>2024/2/28</a:t>
             </a:fld>
             <a:endParaRPr kumimoji="1" lang="zh-CN" altLang="en-US"/>
           </a:p>
@@ -1404,7 +1404,7 @@
           <a:p>
             <a:fld id="{EB96173F-77D8-3A4A-B83C-B33723880ECE}" type="datetimeFigureOut">
               <a:rPr kumimoji="1" lang="zh-CN" altLang="en-US" smtClean="0"/>
-              <a:t>2024/2/15</a:t>
+              <a:t>2024/2/28</a:t>
             </a:fld>
             <a:endParaRPr kumimoji="1" lang="zh-CN" altLang="en-US"/>
           </a:p>
@@ -1816,7 +1816,7 @@
           <a:p>
             <a:fld id="{EB96173F-77D8-3A4A-B83C-B33723880ECE}" type="datetimeFigureOut">
               <a:rPr kumimoji="1" lang="zh-CN" altLang="en-US" smtClean="0"/>
-              <a:t>2024/2/15</a:t>
+              <a:t>2024/2/28</a:t>
             </a:fld>
             <a:endParaRPr kumimoji="1" lang="zh-CN" altLang="en-US"/>
           </a:p>
@@ -1957,7 +1957,7 @@
           <a:p>
             <a:fld id="{EB96173F-77D8-3A4A-B83C-B33723880ECE}" type="datetimeFigureOut">
               <a:rPr kumimoji="1" lang="zh-CN" altLang="en-US" smtClean="0"/>
-              <a:t>2024/2/15</a:t>
+              <a:t>2024/2/28</a:t>
             </a:fld>
             <a:endParaRPr kumimoji="1" lang="zh-CN" altLang="en-US"/>
           </a:p>
@@ -2070,7 +2070,7 @@
           <a:p>
             <a:fld id="{EB96173F-77D8-3A4A-B83C-B33723880ECE}" type="datetimeFigureOut">
               <a:rPr kumimoji="1" lang="zh-CN" altLang="en-US" smtClean="0"/>
-              <a:t>2024/2/15</a:t>
+              <a:t>2024/2/28</a:t>
             </a:fld>
             <a:endParaRPr kumimoji="1" lang="zh-CN" altLang="en-US"/>
           </a:p>
@@ -2381,7 +2381,7 @@
           <a:p>
             <a:fld id="{EB96173F-77D8-3A4A-B83C-B33723880ECE}" type="datetimeFigureOut">
               <a:rPr kumimoji="1" lang="zh-CN" altLang="en-US" smtClean="0"/>
-              <a:t>2024/2/15</a:t>
+              <a:t>2024/2/28</a:t>
             </a:fld>
             <a:endParaRPr kumimoji="1" lang="zh-CN" altLang="en-US"/>
           </a:p>
@@ -2669,7 +2669,7 @@
           <a:p>
             <a:fld id="{EB96173F-77D8-3A4A-B83C-B33723880ECE}" type="datetimeFigureOut">
               <a:rPr kumimoji="1" lang="zh-CN" altLang="en-US" smtClean="0"/>
-              <a:t>2024/2/15</a:t>
+              <a:t>2024/2/28</a:t>
             </a:fld>
             <a:endParaRPr kumimoji="1" lang="zh-CN" altLang="en-US"/>
           </a:p>
@@ -2910,7 +2910,7 @@
           <a:p>
             <a:fld id="{EB96173F-77D8-3A4A-B83C-B33723880ECE}" type="datetimeFigureOut">
               <a:rPr kumimoji="1" lang="zh-CN" altLang="en-US" smtClean="0"/>
-              <a:t>2024/2/15</a:t>
+              <a:t>2024/2/28</a:t>
             </a:fld>
             <a:endParaRPr kumimoji="1" lang="zh-CN" altLang="en-US"/>
           </a:p>
@@ -5820,7 +5820,7 @@
           <a:p>
             <a:r>
               <a:rPr kumimoji="1" lang="en-US" altLang="zh-CN" dirty="0"/>
-              <a:t>010:Rd=R0+R1+Carry</a:t>
+              <a:t>010:Rd=R0+R1</a:t>
             </a:r>
           </a:p>
           <a:p>
@@ -5856,8 +5856,13 @@
           <a:p>
             <a:r>
               <a:rPr kumimoji="1" lang="en-US" altLang="zh-CN" dirty="0"/>
-              <a:t>110:Rd=R0+R1</a:t>
-            </a:r>
+              <a:t>110:Rd=R0</a:t>
+            </a:r>
+            <a:r>
+              <a:rPr kumimoji="1" lang="en-US" altLang="zh-CN"/>
+              <a:t>+R1+Carry</a:t>
+            </a:r>
+            <a:endParaRPr kumimoji="1" lang="en-US" altLang="zh-CN" dirty="0"/>
           </a:p>
           <a:p>
             <a:r>

</xml_diff>